<commit_message>
Proceso de Medición de Métricas
</commit_message>
<xml_diff>
--- a/Area_de_Proceso-_MA/PROMM/PROMM_V1.1_2015.pptx
+++ b/Area_de_Proceso-_MA/PROMM/PROMM_V1.1_2015.pptx
@@ -5,13 +5,14 @@
     <p:sldMasterId id="2147483648" r:id="rId1"/>
   </p:sldMasterIdLst>
   <p:sldIdLst>
-    <p:sldId id="256" r:id="rId2"/>
-    <p:sldId id="257" r:id="rId3"/>
-    <p:sldId id="260" r:id="rId4"/>
-    <p:sldId id="258" r:id="rId5"/>
-    <p:sldId id="261" r:id="rId6"/>
-    <p:sldId id="262" r:id="rId7"/>
-    <p:sldId id="259" r:id="rId8"/>
+    <p:sldId id="263" r:id="rId2"/>
+    <p:sldId id="256" r:id="rId3"/>
+    <p:sldId id="257" r:id="rId4"/>
+    <p:sldId id="260" r:id="rId5"/>
+    <p:sldId id="258" r:id="rId6"/>
+    <p:sldId id="261" r:id="rId7"/>
+    <p:sldId id="262" r:id="rId8"/>
+    <p:sldId id="259" r:id="rId9"/>
   </p:sldIdLst>
   <p:sldSz cx="9144000" cy="6858000" type="screen4x3"/>
   <p:notesSz cx="6858000" cy="9144000"/>
@@ -110,6 +111,22 @@
       </a:defRPr>
     </a:lvl9pPr>
   </p:defaultTextStyle>
+  <p:extLst>
+    <p:ext uri="{EFAFB233-063F-42B5-8137-9DF3F51BA10A}">
+      <p15:sldGuideLst xmlns:p15="http://schemas.microsoft.com/office/powerpoint/2012/main">
+        <p15:guide id="1" orient="horz" pos="2160">
+          <p15:clr>
+            <a:srgbClr val="A4A3A4"/>
+          </p15:clr>
+        </p15:guide>
+        <p15:guide id="2" pos="2880">
+          <p15:clr>
+            <a:srgbClr val="A4A3A4"/>
+          </p15:clr>
+        </p15:guide>
+      </p15:sldGuideLst>
+    </p:ext>
+  </p:extLst>
 </p:presentation>
 </file>
 
@@ -294,7 +311,7 @@
           <a:p>
             <a:fld id="{9A21F846-5431-4507-AE22-A65CEF23C876}" type="datetimeFigureOut">
               <a:rPr lang="es-ES" smtClean="0"/>
-              <a:t>12/02/2013</a:t>
+              <a:t>15/11/2015</a:t>
             </a:fld>
             <a:endParaRPr lang="es-ES"/>
           </a:p>
@@ -459,7 +476,7 @@
           <a:p>
             <a:fld id="{9A21F846-5431-4507-AE22-A65CEF23C876}" type="datetimeFigureOut">
               <a:rPr lang="es-ES" smtClean="0"/>
-              <a:t>12/02/2013</a:t>
+              <a:t>15/11/2015</a:t>
             </a:fld>
             <a:endParaRPr lang="es-ES"/>
           </a:p>
@@ -634,7 +651,7 @@
           <a:p>
             <a:fld id="{9A21F846-5431-4507-AE22-A65CEF23C876}" type="datetimeFigureOut">
               <a:rPr lang="es-ES" smtClean="0"/>
-              <a:t>12/02/2013</a:t>
+              <a:t>15/11/2015</a:t>
             </a:fld>
             <a:endParaRPr lang="es-ES"/>
           </a:p>
@@ -799,7 +816,7 @@
           <a:p>
             <a:fld id="{9A21F846-5431-4507-AE22-A65CEF23C876}" type="datetimeFigureOut">
               <a:rPr lang="es-ES" smtClean="0"/>
-              <a:t>12/02/2013</a:t>
+              <a:t>15/11/2015</a:t>
             </a:fld>
             <a:endParaRPr lang="es-ES"/>
           </a:p>
@@ -1040,7 +1057,7 @@
           <a:p>
             <a:fld id="{9A21F846-5431-4507-AE22-A65CEF23C876}" type="datetimeFigureOut">
               <a:rPr lang="es-ES" smtClean="0"/>
-              <a:t>12/02/2013</a:t>
+              <a:t>15/11/2015</a:t>
             </a:fld>
             <a:endParaRPr lang="es-ES"/>
           </a:p>
@@ -1323,7 +1340,7 @@
           <a:p>
             <a:fld id="{9A21F846-5431-4507-AE22-A65CEF23C876}" type="datetimeFigureOut">
               <a:rPr lang="es-ES" smtClean="0"/>
-              <a:t>12/02/2013</a:t>
+              <a:t>15/11/2015</a:t>
             </a:fld>
             <a:endParaRPr lang="es-ES"/>
           </a:p>
@@ -1740,7 +1757,7 @@
           <a:p>
             <a:fld id="{9A21F846-5431-4507-AE22-A65CEF23C876}" type="datetimeFigureOut">
               <a:rPr lang="es-ES" smtClean="0"/>
-              <a:t>12/02/2013</a:t>
+              <a:t>15/11/2015</a:t>
             </a:fld>
             <a:endParaRPr lang="es-ES"/>
           </a:p>
@@ -1853,7 +1870,7 @@
           <a:p>
             <a:fld id="{9A21F846-5431-4507-AE22-A65CEF23C876}" type="datetimeFigureOut">
               <a:rPr lang="es-ES" smtClean="0"/>
-              <a:t>12/02/2013</a:t>
+              <a:t>15/11/2015</a:t>
             </a:fld>
             <a:endParaRPr lang="es-ES"/>
           </a:p>
@@ -1943,7 +1960,7 @@
           <a:p>
             <a:fld id="{9A21F846-5431-4507-AE22-A65CEF23C876}" type="datetimeFigureOut">
               <a:rPr lang="es-ES" smtClean="0"/>
-              <a:t>12/02/2013</a:t>
+              <a:t>15/11/2015</a:t>
             </a:fld>
             <a:endParaRPr lang="es-ES"/>
           </a:p>
@@ -2215,7 +2232,7 @@
           <a:p>
             <a:fld id="{9A21F846-5431-4507-AE22-A65CEF23C876}" type="datetimeFigureOut">
               <a:rPr lang="es-ES" smtClean="0"/>
-              <a:t>12/02/2013</a:t>
+              <a:t>15/11/2015</a:t>
             </a:fld>
             <a:endParaRPr lang="es-ES"/>
           </a:p>
@@ -2463,7 +2480,7 @@
           <a:p>
             <a:fld id="{9A21F846-5431-4507-AE22-A65CEF23C876}" type="datetimeFigureOut">
               <a:rPr lang="es-ES" smtClean="0"/>
-              <a:t>12/02/2013</a:t>
+              <a:t>15/11/2015</a:t>
             </a:fld>
             <a:endParaRPr lang="es-ES"/>
           </a:p>
@@ -2671,7 +2688,7 @@
           <a:p>
             <a:fld id="{9A21F846-5431-4507-AE22-A65CEF23C876}" type="datetimeFigureOut">
               <a:rPr lang="es-ES" smtClean="0"/>
-              <a:t>12/02/2013</a:t>
+              <a:t>15/11/2015</a:t>
             </a:fld>
             <a:endParaRPr lang="es-ES"/>
           </a:p>
@@ -3043,87 +3060,40 @@
       </p:grpSpPr>
       <p:sp>
         <p:nvSpPr>
-          <p:cNvPr id="4" name="Text Box 2"/>
-          <p:cNvSpPr txBox="1">
-            <a:spLocks noChangeArrowheads="1"/>
-          </p:cNvSpPr>
-          <p:nvPr/>
-        </p:nvSpPr>
-        <p:spPr bwMode="auto">
+          <p:cNvPr id="2" name="Título 1"/>
+          <p:cNvSpPr>
+            <a:spLocks noGrp="1"/>
+          </p:cNvSpPr>
+          <p:nvPr>
+            <p:ph type="title"/>
+          </p:nvPr>
+        </p:nvSpPr>
+        <p:spPr>
           <a:xfrm>
-            <a:off x="1000100" y="1785926"/>
-            <a:ext cx="7200900" cy="2308324"/>
+            <a:off x="457200" y="274638"/>
+            <a:ext cx="8229600" cy="6250706"/>
           </a:xfrm>
-          <a:prstGeom prst="rect">
-            <a:avLst/>
-          </a:prstGeom>
-          <a:noFill/>
-          <a:ln w="9525">
-            <a:noFill/>
-            <a:miter lim="800000"/>
-            <a:headEnd/>
-            <a:tailEnd/>
-          </a:ln>
         </p:spPr>
         <p:txBody>
           <a:bodyPr>
-            <a:spAutoFit/>
+            <a:normAutofit/>
           </a:bodyPr>
           <a:lstStyle/>
           <a:p>
-            <a:pPr algn="ctr"/>
-            <a:r>
-              <a:rPr lang="es-ES_tradnl" sz="3600" b="1" dirty="0">
-                <a:latin typeface="Arial" pitchFamily="34" charset="0"/>
-                <a:cs typeface="Arial" pitchFamily="34" charset="0"/>
-              </a:rPr>
-              <a:t>METAS Y BUENAS PRACTICAS</a:t>
-            </a:r>
-          </a:p>
-          <a:p>
-            <a:pPr algn="ctr"/>
-            <a:r>
-              <a:rPr lang="es-ES_tradnl" sz="3600" b="1" dirty="0">
-                <a:latin typeface="Arial" pitchFamily="34" charset="0"/>
-                <a:cs typeface="Arial" pitchFamily="34" charset="0"/>
-              </a:rPr>
-              <a:t>CATEGORIA </a:t>
-            </a:r>
-            <a:r>
-              <a:rPr lang="es-ES_tradnl" sz="3600" b="1" dirty="0" smtClean="0">
-                <a:latin typeface="Arial" pitchFamily="34" charset="0"/>
-                <a:cs typeface="Arial" pitchFamily="34" charset="0"/>
-              </a:rPr>
-              <a:t>SOPORTE</a:t>
-            </a:r>
-          </a:p>
-          <a:p>
-            <a:pPr algn="ctr"/>
-            <a:r>
-              <a:rPr lang="es-ES_tradnl" sz="3600" b="1" dirty="0" smtClean="0">
-                <a:latin typeface="Arial" pitchFamily="34" charset="0"/>
-                <a:cs typeface="Arial" pitchFamily="34" charset="0"/>
-              </a:rPr>
-              <a:t>MEDICIÓN Y ANÁLISIS</a:t>
-            </a:r>
-          </a:p>
-          <a:p>
-            <a:pPr algn="ctr"/>
-            <a:r>
-              <a:rPr lang="es-ES_tradnl" sz="3600" b="1" dirty="0" smtClean="0">
-                <a:latin typeface="Arial" pitchFamily="34" charset="0"/>
-                <a:cs typeface="Arial" pitchFamily="34" charset="0"/>
-              </a:rPr>
-              <a:t>(MA)</a:t>
-            </a:r>
-            <a:endParaRPr lang="es-ES_tradnl" sz="3600" b="1" dirty="0">
-              <a:latin typeface="Arial" pitchFamily="34" charset="0"/>
-              <a:cs typeface="Arial" pitchFamily="34" charset="0"/>
-            </a:endParaRPr>
+            <a:r>
+              <a:rPr lang="es-PE" sz="6600" dirty="0" smtClean="0"/>
+              <a:t>PROMM PROCESO DE MEDICIÓN DE MÉTRICAS</a:t>
+            </a:r>
+            <a:endParaRPr lang="es-PE" sz="6600" dirty="0"/>
           </a:p>
         </p:txBody>
       </p:sp>
     </p:spTree>
+    <p:extLst>
+      <p:ext uri="{BB962C8B-B14F-4D97-AF65-F5344CB8AC3E}">
+        <p14:creationId xmlns:p14="http://schemas.microsoft.com/office/powerpoint/2010/main" val="3234691716"/>
+      </p:ext>
+    </p:extLst>
   </p:cSld>
   <p:clrMapOvr>
     <a:masterClrMapping/>
@@ -3150,123 +3120,83 @@
       </p:grpSpPr>
       <p:sp>
         <p:nvSpPr>
-          <p:cNvPr id="2" name="Rectangle 2"/>
+          <p:cNvPr id="4" name="Text Box 2"/>
           <p:cNvSpPr txBox="1">
             <a:spLocks noChangeArrowheads="1"/>
           </p:cNvSpPr>
           <p:nvPr/>
         </p:nvSpPr>
-        <p:spPr>
+        <p:spPr bwMode="auto">
           <a:xfrm>
-            <a:off x="971550" y="173038"/>
-            <a:ext cx="8229600" cy="519112"/>
+            <a:off x="1000100" y="1785926"/>
+            <a:ext cx="7200900" cy="2308324"/>
           </a:xfrm>
           <a:prstGeom prst="rect">
             <a:avLst/>
           </a:prstGeom>
           <a:noFill/>
+          <a:ln w="9525">
+            <a:noFill/>
+            <a:miter lim="800000"/>
+            <a:headEnd/>
+            <a:tailEnd/>
+          </a:ln>
         </p:spPr>
         <p:txBody>
-          <a:bodyPr vert="horz" lIns="91440" tIns="45720" rIns="91440" bIns="45720" rtlCol="0" anchor="ctr">
-            <a:noAutofit/>
+          <a:bodyPr>
+            <a:spAutoFit/>
           </a:bodyPr>
           <a:lstStyle/>
           <a:p>
-            <a:pPr marL="0" marR="0" lvl="0" indent="0" algn="ctr" defTabSz="914400" rtl="0" eaLnBrk="1" fontAlgn="auto" latinLnBrk="0" hangingPunct="1">
-              <a:lnSpc>
-                <a:spcPct val="100000"/>
-              </a:lnSpc>
-              <a:spcBef>
-                <a:spcPct val="0"/>
-              </a:spcBef>
-              <a:spcAft>
-                <a:spcPts val="0"/>
-              </a:spcAft>
-              <a:buClrTx/>
-              <a:buSzTx/>
-              <a:buFontTx/>
-              <a:buNone/>
-              <a:tabLst/>
-              <a:defRPr/>
-            </a:pPr>
-            <a:r>
-              <a:rPr kumimoji="0" lang="es-ES" sz="3200" b="0" i="0" u="none" strike="noStrike" kern="1200" cap="none" spc="0" normalizeH="0" baseline="0" noProof="0" dirty="0" smtClean="0">
-                <a:ln>
-                  <a:noFill/>
-                </a:ln>
-                <a:solidFill>
-                  <a:schemeClr val="tx1"/>
-                </a:solidFill>
-                <a:effectLst/>
-                <a:uLnTx/>
-                <a:uFillTx/>
-                <a:latin typeface="Arial" pitchFamily="34" charset="0"/>
-                <a:ea typeface="+mj-ea"/>
-                <a:cs typeface="Arial" pitchFamily="34" charset="0"/>
-              </a:rPr>
-              <a:t>Medición y Análisis (MA) </a:t>
-            </a:r>
-          </a:p>
-        </p:txBody>
-      </p:sp>
-      <p:sp>
-        <p:nvSpPr>
-          <p:cNvPr id="3" name="Rectangle 3"/>
-          <p:cNvSpPr txBox="1">
-            <a:spLocks noChangeArrowheads="1"/>
-          </p:cNvSpPr>
-          <p:nvPr/>
-        </p:nvSpPr>
-        <p:spPr>
-          <a:xfrm>
-            <a:off x="457200" y="1600200"/>
-            <a:ext cx="8229600" cy="4525963"/>
-          </a:xfrm>
-          <a:prstGeom prst="rect">
-            <a:avLst/>
-          </a:prstGeom>
-        </p:spPr>
-        <p:txBody>
-          <a:bodyPr vert="horz" lIns="91440" tIns="45720" rIns="91440" bIns="45720" rtlCol="0">
-            <a:normAutofit/>
-          </a:bodyPr>
-          <a:lstStyle/>
-          <a:p>
-            <a:pPr marL="0" marR="0" lvl="0" indent="0" algn="ctr" defTabSz="914400" rtl="0" eaLnBrk="1" fontAlgn="auto" latinLnBrk="0" hangingPunct="1">
-              <a:lnSpc>
-                <a:spcPct val="100000"/>
-              </a:lnSpc>
-              <a:spcBef>
-                <a:spcPct val="20000"/>
-              </a:spcBef>
-              <a:spcAft>
-                <a:spcPts val="0"/>
-              </a:spcAft>
-              <a:buClrTx/>
-              <a:buSzTx/>
-              <a:buFont typeface="Arial" pitchFamily="34" charset="0"/>
-              <a:buNone/>
-              <a:tabLst/>
-              <a:defRPr/>
-            </a:pPr>
-            <a:r>
-              <a:rPr kumimoji="0" lang="es-ES" sz="2800" b="1" i="0" u="none" strike="noStrike" kern="1200" cap="none" spc="0" normalizeH="0" baseline="0" noProof="0" dirty="0" smtClean="0">
-                <a:ln>
-                  <a:noFill/>
-                </a:ln>
-                <a:solidFill>
-                  <a:schemeClr val="tx1">
-                    <a:tint val="75000"/>
-                  </a:schemeClr>
-                </a:solidFill>
-                <a:effectLst/>
-                <a:uLnTx/>
-                <a:uFillTx/>
+            <a:pPr algn="ctr"/>
+            <a:r>
+              <a:rPr lang="es-ES_tradnl" sz="3600" b="1" dirty="0">
                 <a:latin typeface="Arial" pitchFamily="34" charset="0"/>
                 <a:cs typeface="Arial" pitchFamily="34" charset="0"/>
               </a:rPr>
-              <a:t>Esta área de proceso tiene el propósito de desarrollar y mantener capacidades de medición que permitan satisfacer las necesidades de información de la organización. </a:t>
-            </a:r>
+              <a:t>METAS Y BUENAS PRACTICAS</a:t>
+            </a:r>
+          </a:p>
+          <a:p>
+            <a:pPr algn="ctr"/>
+            <a:r>
+              <a:rPr lang="es-ES_tradnl" sz="3600" b="1" dirty="0">
+                <a:latin typeface="Arial" pitchFamily="34" charset="0"/>
+                <a:cs typeface="Arial" pitchFamily="34" charset="0"/>
+              </a:rPr>
+              <a:t>CATEGORIA </a:t>
+            </a:r>
+            <a:r>
+              <a:rPr lang="es-ES_tradnl" sz="3600" b="1" dirty="0" smtClean="0">
+                <a:latin typeface="Arial" pitchFamily="34" charset="0"/>
+                <a:cs typeface="Arial" pitchFamily="34" charset="0"/>
+              </a:rPr>
+              <a:t>SOPORTE</a:t>
+            </a:r>
+          </a:p>
+          <a:p>
+            <a:pPr algn="ctr"/>
+            <a:r>
+              <a:rPr lang="es-ES_tradnl" sz="3600" b="1" dirty="0" smtClean="0">
+                <a:latin typeface="Arial" pitchFamily="34" charset="0"/>
+                <a:cs typeface="Arial" pitchFamily="34" charset="0"/>
+              </a:rPr>
+              <a:t>MEDICIÓN Y ANÁLISIS</a:t>
+            </a:r>
+          </a:p>
+          <a:p>
+            <a:pPr algn="ctr"/>
+            <a:r>
+              <a:rPr lang="es-ES_tradnl" sz="3600" b="1" dirty="0" smtClean="0">
+                <a:latin typeface="Arial" pitchFamily="34" charset="0"/>
+                <a:cs typeface="Arial" pitchFamily="34" charset="0"/>
+              </a:rPr>
+              <a:t>(MA)</a:t>
+            </a:r>
+            <a:endParaRPr lang="es-ES_tradnl" sz="3600" b="1" dirty="0">
+              <a:latin typeface="Arial" pitchFamily="34" charset="0"/>
+              <a:cs typeface="Arial" pitchFamily="34" charset="0"/>
+            </a:endParaRPr>
           </a:p>
         </p:txBody>
       </p:sp>
@@ -3305,6 +3235,153 @@
         </p:nvSpPr>
         <p:spPr>
           <a:xfrm>
+            <a:off x="971550" y="173038"/>
+            <a:ext cx="8229600" cy="519112"/>
+          </a:xfrm>
+          <a:prstGeom prst="rect">
+            <a:avLst/>
+          </a:prstGeom>
+          <a:noFill/>
+        </p:spPr>
+        <p:txBody>
+          <a:bodyPr vert="horz" lIns="91440" tIns="45720" rIns="91440" bIns="45720" rtlCol="0" anchor="ctr">
+            <a:noAutofit/>
+          </a:bodyPr>
+          <a:lstStyle/>
+          <a:p>
+            <a:pPr marL="0" marR="0" lvl="0" indent="0" algn="ctr" defTabSz="914400" rtl="0" eaLnBrk="1" fontAlgn="auto" latinLnBrk="0" hangingPunct="1">
+              <a:lnSpc>
+                <a:spcPct val="100000"/>
+              </a:lnSpc>
+              <a:spcBef>
+                <a:spcPct val="0"/>
+              </a:spcBef>
+              <a:spcAft>
+                <a:spcPts val="0"/>
+              </a:spcAft>
+              <a:buClrTx/>
+              <a:buSzTx/>
+              <a:buFontTx/>
+              <a:buNone/>
+              <a:tabLst/>
+              <a:defRPr/>
+            </a:pPr>
+            <a:r>
+              <a:rPr kumimoji="0" lang="es-ES" sz="3200" b="0" i="0" u="none" strike="noStrike" kern="1200" cap="none" spc="0" normalizeH="0" baseline="0" noProof="0" dirty="0" smtClean="0">
+                <a:ln>
+                  <a:noFill/>
+                </a:ln>
+                <a:solidFill>
+                  <a:schemeClr val="tx1"/>
+                </a:solidFill>
+                <a:effectLst/>
+                <a:uLnTx/>
+                <a:uFillTx/>
+                <a:latin typeface="Arial" pitchFamily="34" charset="0"/>
+                <a:ea typeface="+mj-ea"/>
+                <a:cs typeface="Arial" pitchFamily="34" charset="0"/>
+              </a:rPr>
+              <a:t>Medición y Análisis (MA) </a:t>
+            </a:r>
+          </a:p>
+        </p:txBody>
+      </p:sp>
+      <p:sp>
+        <p:nvSpPr>
+          <p:cNvPr id="3" name="Rectangle 3"/>
+          <p:cNvSpPr txBox="1">
+            <a:spLocks noChangeArrowheads="1"/>
+          </p:cNvSpPr>
+          <p:nvPr/>
+        </p:nvSpPr>
+        <p:spPr>
+          <a:xfrm>
+            <a:off x="457200" y="1600200"/>
+            <a:ext cx="8229600" cy="4525963"/>
+          </a:xfrm>
+          <a:prstGeom prst="rect">
+            <a:avLst/>
+          </a:prstGeom>
+        </p:spPr>
+        <p:txBody>
+          <a:bodyPr vert="horz" lIns="91440" tIns="45720" rIns="91440" bIns="45720" rtlCol="0">
+            <a:normAutofit/>
+          </a:bodyPr>
+          <a:lstStyle/>
+          <a:p>
+            <a:pPr marL="0" marR="0" lvl="0" indent="0" algn="ctr" defTabSz="914400" rtl="0" eaLnBrk="1" fontAlgn="auto" latinLnBrk="0" hangingPunct="1">
+              <a:lnSpc>
+                <a:spcPct val="100000"/>
+              </a:lnSpc>
+              <a:spcBef>
+                <a:spcPct val="20000"/>
+              </a:spcBef>
+              <a:spcAft>
+                <a:spcPts val="0"/>
+              </a:spcAft>
+              <a:buClrTx/>
+              <a:buSzTx/>
+              <a:buFont typeface="Arial" pitchFamily="34" charset="0"/>
+              <a:buNone/>
+              <a:tabLst/>
+              <a:defRPr/>
+            </a:pPr>
+            <a:r>
+              <a:rPr kumimoji="0" lang="es-ES" sz="2800" b="1" i="0" u="none" strike="noStrike" kern="1200" cap="none" spc="0" normalizeH="0" baseline="0" noProof="0" dirty="0" smtClean="0">
+                <a:ln>
+                  <a:noFill/>
+                </a:ln>
+                <a:solidFill>
+                  <a:schemeClr val="tx1">
+                    <a:tint val="75000"/>
+                  </a:schemeClr>
+                </a:solidFill>
+                <a:effectLst/>
+                <a:uLnTx/>
+                <a:uFillTx/>
+                <a:latin typeface="Arial" pitchFamily="34" charset="0"/>
+                <a:cs typeface="Arial" pitchFamily="34" charset="0"/>
+              </a:rPr>
+              <a:t>Esta área de proceso tiene el propósito de desarrollar y mantener capacidades de medición que permitan satisfacer las necesidades de información de la organización. </a:t>
+            </a:r>
+          </a:p>
+        </p:txBody>
+      </p:sp>
+    </p:spTree>
+  </p:cSld>
+  <p:clrMapOvr>
+    <a:masterClrMapping/>
+  </p:clrMapOvr>
+</p:sld>
+</file>
+
+<file path=ppt/slides/slide4.xml><?xml version="1.0" encoding="utf-8"?>
+<p:sld xmlns:a="http://schemas.openxmlformats.org/drawingml/2006/main" xmlns:r="http://schemas.openxmlformats.org/officeDocument/2006/relationships" xmlns:p="http://schemas.openxmlformats.org/presentationml/2006/main">
+  <p:cSld>
+    <p:spTree>
+      <p:nvGrpSpPr>
+        <p:cNvPr id="1" name=""/>
+        <p:cNvGrpSpPr/>
+        <p:nvPr/>
+      </p:nvGrpSpPr>
+      <p:grpSpPr>
+        <a:xfrm>
+          <a:off x="0" y="0"/>
+          <a:ext cx="0" cy="0"/>
+          <a:chOff x="0" y="0"/>
+          <a:chExt cx="0" cy="0"/>
+        </a:xfrm>
+      </p:grpSpPr>
+      <p:sp>
+        <p:nvSpPr>
+          <p:cNvPr id="2" name="Rectangle 2"/>
+          <p:cNvSpPr txBox="1">
+            <a:spLocks noChangeArrowheads="1"/>
+          </p:cNvSpPr>
+          <p:nvPr/>
+        </p:nvSpPr>
+        <p:spPr>
+          <a:xfrm>
             <a:off x="457200" y="1600200"/>
             <a:ext cx="8229600" cy="4525963"/>
           </a:xfrm>
@@ -3477,7 +3554,7 @@
 </p:sld>
 </file>
 
-<file path=ppt/slides/slide4.xml><?xml version="1.0" encoding="utf-8"?>
+<file path=ppt/slides/slide5.xml><?xml version="1.0" encoding="utf-8"?>
 <p:sld xmlns:a="http://schemas.openxmlformats.org/drawingml/2006/main" xmlns:r="http://schemas.openxmlformats.org/officeDocument/2006/relationships" xmlns:p="http://schemas.openxmlformats.org/presentationml/2006/main">
   <p:cSld>
     <p:spTree>
@@ -3861,7 +3938,7 @@
 </p:sld>
 </file>
 
-<file path=ppt/slides/slide5.xml><?xml version="1.0" encoding="utf-8"?>
+<file path=ppt/slides/slide6.xml><?xml version="1.0" encoding="utf-8"?>
 <p:sld xmlns:a="http://schemas.openxmlformats.org/drawingml/2006/main" xmlns:r="http://schemas.openxmlformats.org/officeDocument/2006/relationships" xmlns:p="http://schemas.openxmlformats.org/presentationml/2006/main">
   <p:cSld>
     <p:spTree>
@@ -4325,7 +4402,7 @@
 </p:sld>
 </file>
 
-<file path=ppt/slides/slide6.xml><?xml version="1.0" encoding="utf-8"?>
+<file path=ppt/slides/slide7.xml><?xml version="1.0" encoding="utf-8"?>
 <p:sld xmlns:a="http://schemas.openxmlformats.org/drawingml/2006/main" xmlns:r="http://schemas.openxmlformats.org/officeDocument/2006/relationships" xmlns:p="http://schemas.openxmlformats.org/presentationml/2006/main">
   <p:cSld>
     <p:spTree>
@@ -4493,7 +4570,7 @@
 </p:sld>
 </file>
 
-<file path=ppt/slides/slide7.xml><?xml version="1.0" encoding="utf-8"?>
+<file path=ppt/slides/slide8.xml><?xml version="1.0" encoding="utf-8"?>
 <p:sld xmlns:a="http://schemas.openxmlformats.org/drawingml/2006/main" xmlns:r="http://schemas.openxmlformats.org/officeDocument/2006/relationships" xmlns:p="http://schemas.openxmlformats.org/presentationml/2006/main">
   <p:cSld>
     <p:spTree>

</xml_diff>